<commit_message>
fixing contd.. in b slides
</commit_message>
<xml_diff>
--- a/database/slides/BECAUSE_HE_LIVES.pptx
+++ b/database/slides/BECAUSE_HE_LIVES.pptx
@@ -15666,21 +15666,8 @@
                   <a:schemeClr val="lt1"/>
                 </a:solidFill>
               </a:rPr>
-              <a:t>An empty grave is there to prove </a:t>
+              <a:t>An empty grave is there to prove my Saviour lives</a:t>
             </a:r>
-            <a:r>
-              <a:rPr lang="en-GB" sz="3400" b="1">
-                <a:solidFill>
-                  <a:schemeClr val="lt1"/>
-                </a:solidFill>
-              </a:rPr>
-              <a:t>my Saviour lives</a:t>
-            </a:r>
-            <a:endParaRPr lang="en-GB" sz="3400" b="1" dirty="0">
-              <a:solidFill>
-                <a:schemeClr val="lt1"/>
-              </a:solidFill>
-            </a:endParaRPr>
           </a:p>
           <a:p>
             <a:pPr marL="114300" indent="0">
@@ -15867,7 +15854,13 @@
       </p:sp>
       <p:sp>
         <p:nvSpPr>
-          <p:cNvPr id="131" name="Google Shape;131;p25"/>
+          <p:cNvPr id="2" name="Google Shape;131;p25">
+            <a:extLst>
+              <a:ext uri="{FF2B5EF4-FFF2-40B4-BE49-F238E27FC236}">
+                <a16:creationId xmlns:a16="http://schemas.microsoft.com/office/drawing/2014/main" id="{55E51FDE-FFC6-91AA-D88E-A82A9E2904A7}"/>
+              </a:ext>
+            </a:extLst>
+          </p:cNvPr>
           <p:cNvSpPr txBox="1"/>
           <p:nvPr/>
         </p:nvSpPr>
@@ -15905,7 +15898,7 @@
               <a:buNone/>
             </a:pPr>
             <a:r>
-              <a:rPr lang="en-GB" sz="3600" b="1" i="1" dirty="0">
+              <a:rPr lang="en-GB" sz="3600" b="1" i="1">
                 <a:solidFill>
                   <a:srgbClr val="FFFF00"/>
                 </a:solidFill>
@@ -15916,7 +15909,7 @@
               </a:rPr>
               <a:t>contd..</a:t>
             </a:r>
-            <a:endParaRPr sz="3600" dirty="0">
+            <a:endParaRPr sz="3600">
               <a:latin typeface="Calibri"/>
               <a:ea typeface="Calibri"/>
               <a:cs typeface="Calibri"/>

</xml_diff>